<commit_message>
created PDF of presentation
</commit_message>
<xml_diff>
--- a/GA DS final presentation.pptx
+++ b/GA DS final presentation.pptx
@@ -4787,7 +4787,7 @@
           <a:p>
             <a:fld id="{11709BA1-A780-DF40-B4BB-8582F9E8C86A}" type="datetimeFigureOut">
               <a:rPr lang="en-US" smtClean="0"/>
-              <a:t>11/15/13</a:t>
+              <a:t>11/19/13</a:t>
             </a:fld>
             <a:endParaRPr lang="en-US"/>
           </a:p>
@@ -5161,7 +5161,7 @@
           <a:p>
             <a:fld id="{11709BA1-A780-DF40-B4BB-8582F9E8C86A}" type="datetimeFigureOut">
               <a:rPr lang="en-US" smtClean="0"/>
-              <a:t>11/15/13</a:t>
+              <a:t>11/19/13</a:t>
             </a:fld>
             <a:endParaRPr lang="en-US"/>
           </a:p>
@@ -5538,7 +5538,7 @@
           <a:p>
             <a:fld id="{11709BA1-A780-DF40-B4BB-8582F9E8C86A}" type="datetimeFigureOut">
               <a:rPr lang="en-US" smtClean="0"/>
-              <a:t>11/15/13</a:t>
+              <a:t>11/19/13</a:t>
             </a:fld>
             <a:endParaRPr lang="en-US"/>
           </a:p>
@@ -6047,7 +6047,7 @@
           <a:p>
             <a:fld id="{11709BA1-A780-DF40-B4BB-8582F9E8C86A}" type="datetimeFigureOut">
               <a:rPr lang="en-US" smtClean="0"/>
-              <a:t>11/15/13</a:t>
+              <a:t>11/19/13</a:t>
             </a:fld>
             <a:endParaRPr lang="en-US"/>
           </a:p>
@@ -6288,7 +6288,7 @@
           <a:p>
             <a:fld id="{11709BA1-A780-DF40-B4BB-8582F9E8C86A}" type="datetimeFigureOut">
               <a:rPr lang="en-US" smtClean="0"/>
-              <a:t>11/15/13</a:t>
+              <a:t>11/19/13</a:t>
             </a:fld>
             <a:endParaRPr lang="en-US"/>
           </a:p>
@@ -6519,7 +6519,7 @@
           <a:p>
             <a:fld id="{11709BA1-A780-DF40-B4BB-8582F9E8C86A}" type="datetimeFigureOut">
               <a:rPr lang="en-US" smtClean="0"/>
-              <a:t>11/15/13</a:t>
+              <a:t>11/19/13</a:t>
             </a:fld>
             <a:endParaRPr lang="en-US"/>
           </a:p>
@@ -13875,7 +13875,7 @@
           <a:p>
             <a:fld id="{11709BA1-A780-DF40-B4BB-8582F9E8C86A}" type="datetimeFigureOut">
               <a:rPr lang="en-US" smtClean="0"/>
-              <a:t>11/15/13</a:t>
+              <a:t>11/19/13</a:t>
             </a:fld>
             <a:endParaRPr lang="en-US"/>
           </a:p>
@@ -14412,7 +14412,7 @@
           <a:p>
             <a:fld id="{11709BA1-A780-DF40-B4BB-8582F9E8C86A}" type="datetimeFigureOut">
               <a:rPr lang="en-US" smtClean="0"/>
-              <a:t>11/15/13</a:t>
+              <a:t>11/19/13</a:t>
             </a:fld>
             <a:endParaRPr lang="en-US"/>
           </a:p>
@@ -14587,7 +14587,7 @@
           <a:p>
             <a:fld id="{11709BA1-A780-DF40-B4BB-8582F9E8C86A}" type="datetimeFigureOut">
               <a:rPr lang="en-US" smtClean="0"/>
-              <a:t>11/15/13</a:t>
+              <a:t>11/19/13</a:t>
             </a:fld>
             <a:endParaRPr lang="en-US"/>
           </a:p>
@@ -14677,7 +14677,7 @@
           <a:p>
             <a:fld id="{11709BA1-A780-DF40-B4BB-8582F9E8C86A}" type="datetimeFigureOut">
               <a:rPr lang="en-US" smtClean="0"/>
-              <a:t>11/15/13</a:t>
+              <a:t>11/19/13</a:t>
             </a:fld>
             <a:endParaRPr lang="en-US"/>
           </a:p>
@@ -15013,7 +15013,7 @@
           <a:p>
             <a:fld id="{11709BA1-A780-DF40-B4BB-8582F9E8C86A}" type="datetimeFigureOut">
               <a:rPr lang="en-US" smtClean="0"/>
-              <a:t>11/15/13</a:t>
+              <a:t>11/19/13</a:t>
             </a:fld>
             <a:endParaRPr lang="en-US"/>
           </a:p>
@@ -16434,7 +16434,7 @@
           <a:p>
             <a:fld id="{11709BA1-A780-DF40-B4BB-8582F9E8C86A}" type="datetimeFigureOut">
               <a:rPr lang="en-US" smtClean="0"/>
-              <a:t>11/15/13</a:t>
+              <a:t>11/19/13</a:t>
             </a:fld>
             <a:endParaRPr lang="en-US"/>
           </a:p>
@@ -17393,12 +17393,14 @@
             </a:r>
           </a:p>
           <a:p>
+            <a:pPr lvl="1"/>
             <a:r>
               <a:rPr lang="en-US" dirty="0" smtClean="0"/>
               <a:t>Generic well-formed sentences</a:t>
             </a:r>
           </a:p>
           <a:p>
+            <a:pPr lvl="1"/>
             <a:r>
               <a:rPr lang="en-US" dirty="0" smtClean="0"/>
               <a:t>Location mentions</a:t>
@@ -18098,15 +18100,15 @@
           <a:p>
             <a:r>
               <a:rPr lang="en-US" dirty="0" smtClean="0"/>
-              <a:t>Slightly over 518 artists had Twitter handles and enough </a:t>
+              <a:t>Slightly over </a:t>
             </a:r>
             <a:r>
               <a:rPr lang="en-US" dirty="0" smtClean="0"/>
-              <a:t>data </a:t>
+              <a:t>500 </a:t>
             </a:r>
             <a:r>
               <a:rPr lang="en-US" dirty="0" smtClean="0"/>
-              <a:t>to be included in the library.</a:t>
+              <a:t>artists had Twitter handles and enough data to be included in the library.</a:t>
             </a:r>
             <a:endParaRPr lang="en-US" dirty="0"/>
           </a:p>
@@ -18310,7 +18312,15 @@
           <a:p>
             <a:r>
               <a:rPr lang="en-US" dirty="0" smtClean="0"/>
-              <a:t>Weights a term based on its frequency in a single document and it’s inverse frequency in the whole corpus.</a:t>
+              <a:t>Weights a term based on its frequency in a single document and </a:t>
+            </a:r>
+            <a:r>
+              <a:rPr lang="en-US" dirty="0" smtClean="0"/>
+              <a:t>its </a:t>
+            </a:r>
+            <a:r>
+              <a:rPr lang="en-US" dirty="0" smtClean="0"/>
+              <a:t>inverse frequency in the whole corpus.</a:t>
             </a:r>
           </a:p>
           <a:p>

</xml_diff>